<commit_message>
Mise du  diaporama de présentation sur github
</commit_message>
<xml_diff>
--- a/TheLostScrollOfIUT/docs/livrables/PrésentationOral.pptx
+++ b/TheLostScrollOfIUT/docs/livrables/PrésentationOral.pptx
@@ -8,10 +8,9 @@
     <p:sldId id="256" r:id="rId2"/>
     <p:sldId id="260" r:id="rId3"/>
     <p:sldId id="259" r:id="rId4"/>
-    <p:sldId id="257" r:id="rId5"/>
+    <p:sldId id="261" r:id="rId5"/>
     <p:sldId id="262" r:id="rId6"/>
-    <p:sldId id="261" r:id="rId7"/>
-    <p:sldId id="258" r:id="rId8"/>
+    <p:sldId id="258" r:id="rId7"/>
   </p:sldIdLst>
   <p:sldSz cx="9144000" cy="6858000" type="screen4x3"/>
   <p:notesSz cx="6858000" cy="9144000"/>
@@ -498,7 +497,7 @@
             <a:fld id="{AA309A6D-C09C-4548-B29A-6CF363A7E532}" type="datetimeFigureOut">
               <a:rPr lang="fr-FR" smtClean="0"/>
               <a:pPr/>
-              <a:t>11/06/2014</a:t>
+              <a:t>12/06/2014</a:t>
             </a:fld>
             <a:endParaRPr lang="fr-BE"/>
           </a:p>
@@ -552,9 +551,6 @@
   <p:clrMapOvr>
     <a:overrideClrMapping bg1="dk1" tx1="lt1" bg2="dk2" tx2="lt2" accent1="accent1" accent2="accent2" accent3="accent3" accent4="accent4" accent5="accent5" accent6="accent6" hlink="hlink" folHlink="folHlink"/>
   </p:clrMapOvr>
-  <p:transition>
-    <p:cover dir="u"/>
-  </p:transition>
 </p:sldLayout>
 </file>
 
@@ -668,7 +664,7 @@
             <a:fld id="{AA309A6D-C09C-4548-B29A-6CF363A7E532}" type="datetimeFigureOut">
               <a:rPr lang="fr-FR" smtClean="0"/>
               <a:pPr/>
-              <a:t>11/06/2014</a:t>
+              <a:t>12/06/2014</a:t>
             </a:fld>
             <a:endParaRPr lang="fr-BE"/>
           </a:p>
@@ -722,9 +718,6 @@
   <p:clrMapOvr>
     <a:masterClrMapping/>
   </p:clrMapOvr>
-  <p:transition>
-    <p:cover dir="u"/>
-  </p:transition>
 </p:sldLayout>
 </file>
 
@@ -848,7 +841,7 @@
             <a:fld id="{AA309A6D-C09C-4548-B29A-6CF363A7E532}" type="datetimeFigureOut">
               <a:rPr lang="fr-FR" smtClean="0"/>
               <a:pPr/>
-              <a:t>11/06/2014</a:t>
+              <a:t>12/06/2014</a:t>
             </a:fld>
             <a:endParaRPr lang="fr-BE"/>
           </a:p>
@@ -902,9 +895,6 @@
   <p:clrMapOvr>
     <a:masterClrMapping/>
   </p:clrMapOvr>
-  <p:transition>
-    <p:cover dir="u"/>
-  </p:transition>
 </p:sldLayout>
 </file>
 
@@ -1022,7 +1012,7 @@
             <a:fld id="{AA309A6D-C09C-4548-B29A-6CF363A7E532}" type="datetimeFigureOut">
               <a:rPr lang="fr-FR" smtClean="0"/>
               <a:pPr/>
-              <a:t>11/06/2014</a:t>
+              <a:t>12/06/2014</a:t>
             </a:fld>
             <a:endParaRPr lang="fr-BE"/>
           </a:p>
@@ -1076,9 +1066,6 @@
   <p:clrMapOvr>
     <a:masterClrMapping/>
   </p:clrMapOvr>
-  <p:transition>
-    <p:cover dir="u"/>
-  </p:transition>
 </p:sldLayout>
 </file>
 
@@ -1482,7 +1469,7 @@
             <a:fld id="{AA309A6D-C09C-4548-B29A-6CF363A7E532}" type="datetimeFigureOut">
               <a:rPr lang="fr-FR" smtClean="0"/>
               <a:pPr/>
-              <a:t>11/06/2014</a:t>
+              <a:t>12/06/2014</a:t>
             </a:fld>
             <a:endParaRPr lang="fr-BE"/>
           </a:p>
@@ -1536,9 +1523,6 @@
   <p:clrMapOvr>
     <a:overrideClrMapping bg1="dk1" tx1="lt1" bg2="dk2" tx2="lt2" accent1="accent1" accent2="accent2" accent3="accent3" accent4="accent4" accent5="accent5" accent6="accent6" hlink="hlink" folHlink="folHlink"/>
   </p:clrMapOvr>
-  <p:transition>
-    <p:cover dir="u"/>
-  </p:transition>
 </p:sldLayout>
 </file>
 
@@ -1751,7 +1735,7 @@
             <a:fld id="{AA309A6D-C09C-4548-B29A-6CF363A7E532}" type="datetimeFigureOut">
               <a:rPr lang="fr-FR" smtClean="0"/>
               <a:pPr/>
-              <a:t>11/06/2014</a:t>
+              <a:t>12/06/2014</a:t>
             </a:fld>
             <a:endParaRPr lang="fr-BE"/>
           </a:p>
@@ -1805,9 +1789,6 @@
   <p:clrMapOvr>
     <a:masterClrMapping/>
   </p:clrMapOvr>
-  <p:transition>
-    <p:cover dir="u"/>
-  </p:transition>
 </p:sldLayout>
 </file>
 
@@ -2130,7 +2111,7 @@
             <a:fld id="{AA309A6D-C09C-4548-B29A-6CF363A7E532}" type="datetimeFigureOut">
               <a:rPr lang="fr-FR" smtClean="0"/>
               <a:pPr/>
-              <a:t>11/06/2014</a:t>
+              <a:t>12/06/2014</a:t>
             </a:fld>
             <a:endParaRPr lang="fr-BE"/>
           </a:p>
@@ -2184,9 +2165,6 @@
   <p:clrMapOvr>
     <a:masterClrMapping/>
   </p:clrMapOvr>
-  <p:transition>
-    <p:cover dir="u"/>
-  </p:transition>
 </p:sldLayout>
 </file>
 
@@ -2257,7 +2235,7 @@
             <a:fld id="{AA309A6D-C09C-4548-B29A-6CF363A7E532}" type="datetimeFigureOut">
               <a:rPr lang="fr-FR" smtClean="0"/>
               <a:pPr/>
-              <a:t>11/06/2014</a:t>
+              <a:t>12/06/2014</a:t>
             </a:fld>
             <a:endParaRPr lang="fr-BE"/>
           </a:p>
@@ -2311,9 +2289,6 @@
   <p:clrMapOvr>
     <a:masterClrMapping/>
   </p:clrMapOvr>
-  <p:transition>
-    <p:cover dir="u"/>
-  </p:transition>
 </p:sldLayout>
 </file>
 
@@ -2352,7 +2327,7 @@
             <a:fld id="{AA309A6D-C09C-4548-B29A-6CF363A7E532}" type="datetimeFigureOut">
               <a:rPr lang="fr-FR" smtClean="0"/>
               <a:pPr/>
-              <a:t>11/06/2014</a:t>
+              <a:t>12/06/2014</a:t>
             </a:fld>
             <a:endParaRPr lang="fr-BE"/>
           </a:p>
@@ -2406,9 +2381,6 @@
   <p:clrMapOvr>
     <a:masterClrMapping/>
   </p:clrMapOvr>
-  <p:transition>
-    <p:cover dir="u"/>
-  </p:transition>
 </p:sldLayout>
 </file>
 
@@ -2606,7 +2578,7 @@
             <a:fld id="{AA309A6D-C09C-4548-B29A-6CF363A7E532}" type="datetimeFigureOut">
               <a:rPr lang="fr-FR" smtClean="0"/>
               <a:pPr/>
-              <a:t>11/06/2014</a:t>
+              <a:t>12/06/2014</a:t>
             </a:fld>
             <a:endParaRPr lang="fr-BE"/>
           </a:p>
@@ -2665,9 +2637,6 @@
   <p:clrMapOvr>
     <a:masterClrMapping/>
   </p:clrMapOvr>
-  <p:transition>
-    <p:cover dir="u"/>
-  </p:transition>
 </p:sldLayout>
 </file>
 
@@ -2870,7 +2839,7 @@
             <a:fld id="{AA309A6D-C09C-4548-B29A-6CF363A7E532}" type="datetimeFigureOut">
               <a:rPr lang="fr-FR" smtClean="0"/>
               <a:pPr/>
-              <a:t>11/06/2014</a:t>
+              <a:t>12/06/2014</a:t>
             </a:fld>
             <a:endParaRPr lang="fr-BE"/>
           </a:p>
@@ -2924,9 +2893,6 @@
   <p:clrMapOvr>
     <a:masterClrMapping/>
   </p:clrMapOvr>
-  <p:transition>
-    <p:cover dir="u"/>
-  </p:transition>
 </p:sldLayout>
 </file>
 
@@ -3279,7 +3245,7 @@
             <a:fld id="{AA309A6D-C09C-4548-B29A-6CF363A7E532}" type="datetimeFigureOut">
               <a:rPr lang="fr-FR" smtClean="0"/>
               <a:pPr/>
-              <a:t>11/06/2014</a:t>
+              <a:t>12/06/2014</a:t>
             </a:fld>
             <a:endParaRPr lang="fr-BE"/>
           </a:p>
@@ -3380,9 +3346,6 @@
     <p:sldLayoutId id="2147483694" r:id="rId10"/>
     <p:sldLayoutId id="2147483695" r:id="rId11"/>
   </p:sldLayoutIdLst>
-  <p:transition>
-    <p:cover dir="u"/>
-  </p:transition>
   <p:txStyles>
     <p:titleStyle>
       <a:lvl1pPr algn="l" rtl="0" eaLnBrk="1" latinLnBrk="0" hangingPunct="1">
@@ -3737,9 +3700,7 @@
   <p:clrMapOvr>
     <a:masterClrMapping/>
   </p:clrMapOvr>
-  <p:transition>
-    <p:cover dir="u"/>
-  </p:transition>
+  <p:transition/>
   <p:timing>
     <p:tnLst>
       <p:par>
@@ -3869,7 +3830,7 @@
     <a:masterClrMapping/>
   </p:clrMapOvr>
   <p:transition>
-    <p:cover dir="u"/>
+    <p:pull dir="ld"/>
   </p:transition>
   <p:timing>
     <p:tnLst>
@@ -3922,11 +3883,19 @@
           <a:p>
             <a:r>
               <a:rPr lang="fr-FR" sz="3600" dirty="0" smtClean="0"/>
-              <a:t>L’organisation du travail au sein de l’</a:t>
-            </a:r>
-            <a:r>
-              <a:rPr lang="fr-FR" sz="3600" dirty="0" err="1" smtClean="0"/>
-              <a:t>equipe</a:t>
+              <a:t>L’organisation du travail au sein de </a:t>
+            </a:r>
+            <a:r>
+              <a:rPr lang="fr-FR" sz="3600" dirty="0" smtClean="0"/>
+              <a:t>l’</a:t>
+            </a:r>
+            <a:r>
+              <a:rPr lang="fr-FR" sz="3600" dirty="0" smtClean="0"/>
+              <a:t>é</a:t>
+            </a:r>
+            <a:r>
+              <a:rPr lang="fr-FR" sz="3600" dirty="0" smtClean="0"/>
+              <a:t>quipe</a:t>
             </a:r>
             <a:endParaRPr lang="fr-FR" sz="3600" dirty="0"/>
           </a:p>
@@ -3942,7 +3911,12 @@
             <p:ph idx="1"/>
           </p:nvPr>
         </p:nvSpPr>
-        <p:spPr/>
+        <p:spPr>
+          <a:xfrm>
+            <a:off x="539552" y="1196752"/>
+            <a:ext cx="7467600" cy="5661248"/>
+          </a:xfrm>
+        </p:spPr>
         <p:txBody>
           <a:bodyPr>
             <a:normAutofit/>
@@ -3958,8 +3932,13 @@
             <a:pPr lvl="1"/>
             <a:r>
               <a:rPr lang="fr-FR" sz="1800" dirty="0" smtClean="0"/>
-              <a:t>tout les jeudi après midi au moins 2h.</a:t>
-            </a:r>
+              <a:t>tout les jeudi après midi au moins 2h</a:t>
+            </a:r>
+            <a:r>
+              <a:rPr lang="fr-FR" sz="1800" dirty="0" smtClean="0"/>
+              <a:t>. </a:t>
+            </a:r>
+            <a:endParaRPr lang="fr-FR" sz="1800" dirty="0" smtClean="0"/>
           </a:p>
           <a:p>
             <a:pPr lvl="1"/>
@@ -3969,33 +3948,176 @@
             </a:r>
           </a:p>
           <a:p>
-            <a:pPr lvl="1"/>
-            <a:r>
-              <a:rPr lang="fr-FR" sz="1800" dirty="0" smtClean="0"/>
-              <a:t>Et certains jours afin d’avancer via des logiciels de communication</a:t>
-            </a:r>
-          </a:p>
-          <a:p>
             <a:pPr lvl="1">
               <a:buNone/>
             </a:pPr>
             <a:endParaRPr lang="fr-FR" sz="1800" dirty="0" smtClean="0"/>
           </a:p>
           <a:p>
+            <a:pPr lvl="1">
+              <a:buNone/>
+            </a:pPr>
+            <a:endParaRPr lang="fr-FR" sz="1800" dirty="0" smtClean="0"/>
+          </a:p>
+          <a:p>
+            <a:pPr lvl="1">
+              <a:buNone/>
+            </a:pPr>
+            <a:endParaRPr lang="fr-FR" sz="1800" dirty="0" smtClean="0"/>
+          </a:p>
+          <a:p>
+            <a:pPr lvl="1">
+              <a:buNone/>
+            </a:pPr>
+            <a:endParaRPr lang="fr-FR" sz="1800" dirty="0" smtClean="0"/>
+          </a:p>
+          <a:p>
+            <a:pPr lvl="1">
+              <a:buNone/>
+            </a:pPr>
+            <a:endParaRPr lang="fr-FR" sz="1800" dirty="0" smtClean="0"/>
+          </a:p>
+          <a:p>
+            <a:pPr lvl="1">
+              <a:buNone/>
+            </a:pPr>
+            <a:endParaRPr lang="fr-FR" sz="1800" dirty="0" smtClean="0"/>
+          </a:p>
+          <a:p>
+            <a:pPr lvl="1">
+              <a:buNone/>
+            </a:pPr>
+            <a:endParaRPr lang="fr-FR" sz="1800" dirty="0" smtClean="0"/>
+          </a:p>
+          <a:p>
+            <a:pPr lvl="1">
+              <a:buNone/>
+            </a:pPr>
+            <a:endParaRPr lang="fr-FR" sz="1800" dirty="0" smtClean="0"/>
+          </a:p>
+          <a:p>
+            <a:pPr lvl="1">
+              <a:buNone/>
+            </a:pPr>
+            <a:endParaRPr lang="fr-FR" sz="1800" dirty="0" smtClean="0"/>
+          </a:p>
+          <a:p>
+            <a:pPr lvl="1">
+              <a:buNone/>
+            </a:pPr>
+            <a:endParaRPr lang="fr-FR" sz="1800" dirty="0" smtClean="0"/>
+          </a:p>
+          <a:p>
             <a:r>
               <a:rPr lang="fr-FR" sz="1800" dirty="0" smtClean="0"/>
-              <a:t>Le reste du temps, c’est un travail personnel avant de se rassembler pour mettre au point ou avancer en groupe de 2 ou encore avancer sur des éléments ou tout le groupe est en difficulté.</a:t>
-            </a:r>
-          </a:p>
-        </p:txBody>
-      </p:sp>
+              <a:t>T</a:t>
+            </a:r>
+            <a:r>
+              <a:rPr lang="fr-FR" sz="1800" dirty="0" smtClean="0"/>
+              <a:t>ravail </a:t>
+            </a:r>
+            <a:r>
+              <a:rPr lang="fr-FR" sz="1800" dirty="0" smtClean="0"/>
+              <a:t>personnel </a:t>
+            </a:r>
+            <a:r>
+              <a:rPr lang="fr-FR" sz="1800" dirty="0" smtClean="0"/>
+              <a:t>puis mise au </a:t>
+            </a:r>
+            <a:r>
+              <a:rPr lang="fr-FR" sz="1800" dirty="0" smtClean="0"/>
+              <a:t>point </a:t>
+            </a:r>
+            <a:r>
+              <a:rPr lang="fr-FR" sz="1800" dirty="0" smtClean="0"/>
+              <a:t>en groupe.</a:t>
+            </a:r>
+          </a:p>
+          <a:p>
+            <a:pPr>
+              <a:buNone/>
+            </a:pPr>
+            <a:r>
+              <a:rPr lang="fr-FR" sz="1800" dirty="0" smtClean="0"/>
+              <a:t>	</a:t>
+            </a:r>
+            <a:r>
+              <a:rPr lang="fr-FR" sz="1800" b="1" u="sng" dirty="0" smtClean="0"/>
+              <a:t>Travail   : </a:t>
+            </a:r>
+            <a:r>
+              <a:rPr lang="fr-FR" sz="1800" dirty="0" smtClean="0"/>
+              <a:t>	seul pour les classes et méthodes de bases</a:t>
+            </a:r>
+          </a:p>
+          <a:p>
+            <a:pPr>
+              <a:buNone/>
+            </a:pPr>
+            <a:r>
+              <a:rPr lang="fr-FR" sz="1800" dirty="0" smtClean="0"/>
+              <a:t>	</a:t>
+            </a:r>
+            <a:r>
+              <a:rPr lang="fr-FR" sz="1800" dirty="0" smtClean="0"/>
+              <a:t>		en binôme pour les méthodes compliqués</a:t>
+            </a:r>
+          </a:p>
+          <a:p>
+            <a:pPr>
+              <a:buNone/>
+            </a:pPr>
+            <a:r>
+              <a:rPr lang="fr-FR" sz="1800" dirty="0" smtClean="0"/>
+              <a:t>	</a:t>
+            </a:r>
+            <a:r>
+              <a:rPr lang="fr-FR" sz="1800" dirty="0" smtClean="0"/>
+              <a:t>		en groupe entier pour les plus grosses difficultés</a:t>
+            </a:r>
+            <a:endParaRPr lang="fr-FR" sz="1800" dirty="0" smtClean="0"/>
+          </a:p>
+        </p:txBody>
+      </p:sp>
+      <p:pic>
+        <p:nvPicPr>
+          <p:cNvPr id="4" name="Picture 2"/>
+          <p:cNvPicPr>
+            <a:picLocks noChangeAspect="1" noChangeArrowheads="1"/>
+          </p:cNvPicPr>
+          <p:nvPr/>
+        </p:nvPicPr>
+        <p:blipFill>
+          <a:blip r:embed="rId2" cstate="print"/>
+          <a:srcRect/>
+          <a:stretch>
+            <a:fillRect/>
+          </a:stretch>
+        </p:blipFill>
+        <p:spPr bwMode="auto">
+          <a:xfrm>
+            <a:off x="971600" y="2276872"/>
+            <a:ext cx="5932863" cy="3145557"/>
+          </a:xfrm>
+          <a:prstGeom prst="rect">
+            <a:avLst/>
+          </a:prstGeom>
+          <a:noFill/>
+          <a:ln w="9525">
+            <a:noFill/>
+            <a:miter lim="800000"/>
+            <a:headEnd/>
+            <a:tailEnd/>
+          </a:ln>
+        </p:spPr>
+      </p:pic>
     </p:spTree>
   </p:cSld>
   <p:clrMapOvr>
     <a:masterClrMapping/>
   </p:clrMapOvr>
   <p:transition>
-    <p:cover dir="u"/>
+    <p:pull dir="ld"/>
   </p:transition>
   <p:timing>
     <p:tnLst>
@@ -4024,45 +4146,99 @@
           <a:chExt cx="0" cy="0"/>
         </a:xfrm>
       </p:grpSpPr>
-      <p:pic>
-        <p:nvPicPr>
-          <p:cNvPr id="1026" name="Picture 2"/>
-          <p:cNvPicPr>
-            <a:picLocks noChangeAspect="1" noChangeArrowheads="1"/>
-          </p:cNvPicPr>
-          <p:nvPr/>
-        </p:nvPicPr>
-        <p:blipFill>
-          <a:blip r:embed="rId2" cstate="print"/>
-          <a:srcRect/>
-          <a:stretch>
-            <a:fillRect/>
-          </a:stretch>
-        </p:blipFill>
-        <p:spPr bwMode="auto">
-          <a:xfrm>
-            <a:off x="179512" y="1052736"/>
-            <a:ext cx="8784976" cy="4657725"/>
-          </a:xfrm>
-          <a:prstGeom prst="rect">
-            <a:avLst/>
-          </a:prstGeom>
-          <a:noFill/>
-          <a:ln w="9525">
-            <a:noFill/>
-            <a:miter lim="800000"/>
-            <a:headEnd/>
-            <a:tailEnd/>
-          </a:ln>
-        </p:spPr>
-      </p:pic>
+      <p:sp>
+        <p:nvSpPr>
+          <p:cNvPr id="2" name="Titre 1"/>
+          <p:cNvSpPr>
+            <a:spLocks noGrp="1"/>
+          </p:cNvSpPr>
+          <p:nvPr>
+            <p:ph type="title"/>
+          </p:nvPr>
+        </p:nvSpPr>
+        <p:spPr/>
+        <p:txBody>
+          <a:bodyPr>
+            <a:normAutofit fontScale="90000"/>
+          </a:bodyPr>
+          <a:lstStyle/>
+          <a:p>
+            <a:r>
+              <a:rPr lang="fr-FR" dirty="0" smtClean="0"/>
+              <a:t>Pourcentage du projet effectué</a:t>
+            </a:r>
+            <a:endParaRPr lang="fr-FR" dirty="0"/>
+          </a:p>
+        </p:txBody>
+      </p:sp>
+      <p:sp>
+        <p:nvSpPr>
+          <p:cNvPr id="3" name="Espace réservé du contenu 2"/>
+          <p:cNvSpPr>
+            <a:spLocks noGrp="1"/>
+          </p:cNvSpPr>
+          <p:nvPr>
+            <p:ph idx="1"/>
+          </p:nvPr>
+        </p:nvSpPr>
+        <p:spPr/>
+        <p:txBody>
+          <a:bodyPr/>
+          <a:lstStyle/>
+          <a:p>
+            <a:r>
+              <a:rPr lang="fr-FR" dirty="0" smtClean="0"/>
+              <a:t>Jeremy 40%	 </a:t>
+            </a:r>
+          </a:p>
+          <a:p>
+            <a:r>
+              <a:rPr lang="fr-FR" dirty="0" err="1" smtClean="0"/>
+              <a:t>Thai</a:t>
+            </a:r>
+            <a:r>
+              <a:rPr lang="fr-FR" dirty="0" smtClean="0"/>
+              <a:t> </a:t>
+            </a:r>
+            <a:r>
+              <a:rPr lang="fr-FR" dirty="0" err="1" smtClean="0"/>
+              <a:t>Binh</a:t>
+            </a:r>
+            <a:r>
+              <a:rPr lang="fr-FR" dirty="0" smtClean="0"/>
+              <a:t> 30%</a:t>
+            </a:r>
+          </a:p>
+          <a:p>
+            <a:r>
+              <a:rPr lang="fr-FR" dirty="0" err="1" smtClean="0"/>
+              <a:t>Adem</a:t>
+            </a:r>
+            <a:r>
+              <a:rPr lang="fr-FR" dirty="0" smtClean="0"/>
+              <a:t> 15 %</a:t>
+            </a:r>
+          </a:p>
+          <a:p>
+            <a:r>
+              <a:rPr lang="fr-FR" dirty="0" err="1" smtClean="0"/>
+              <a:t>Loic</a:t>
+            </a:r>
+            <a:r>
+              <a:rPr lang="fr-FR" dirty="0" smtClean="0"/>
+              <a:t> 15 %</a:t>
+            </a:r>
+            <a:endParaRPr lang="fr-FR" dirty="0"/>
+          </a:p>
+        </p:txBody>
+      </p:sp>
     </p:spTree>
   </p:cSld>
   <p:clrMapOvr>
     <a:masterClrMapping/>
   </p:clrMapOvr>
   <p:transition>
-    <p:cover dir="u"/>
+    <p:pull dir="ld"/>
   </p:transition>
   <p:timing>
     <p:tnLst>
@@ -4093,29 +4269,6 @@
       </p:grpSpPr>
       <p:sp>
         <p:nvSpPr>
-          <p:cNvPr id="2" name="Titre 1"/>
-          <p:cNvSpPr>
-            <a:spLocks noGrp="1"/>
-          </p:cNvSpPr>
-          <p:nvPr>
-            <p:ph type="title"/>
-          </p:nvPr>
-        </p:nvSpPr>
-        <p:spPr/>
-        <p:txBody>
-          <a:bodyPr/>
-          <a:lstStyle/>
-          <a:p>
-            <a:r>
-              <a:rPr lang="fr-FR" dirty="0" smtClean="0"/>
-              <a:t>Répartition des taches</a:t>
-            </a:r>
-            <a:endParaRPr lang="fr-FR" dirty="0"/>
-          </a:p>
-        </p:txBody>
-      </p:sp>
-      <p:sp>
-        <p:nvSpPr>
           <p:cNvPr id="3" name="Espace réservé du contenu 2"/>
           <p:cNvSpPr>
             <a:spLocks noGrp="1"/>
@@ -4124,30 +4277,99 @@
             <p:ph idx="1"/>
           </p:nvPr>
         </p:nvSpPr>
-        <p:spPr/>
-        <p:txBody>
-          <a:bodyPr/>
-          <a:lstStyle/>
-          <a:p>
-            <a:r>
-              <a:rPr lang="fr-FR" dirty="0" smtClean="0"/>
-              <a:t>Travail collectif sur les classes de base.</a:t>
-            </a:r>
-          </a:p>
-          <a:p>
-            <a:endParaRPr lang="fr-FR" dirty="0" smtClean="0"/>
-          </a:p>
-          <a:p>
-            <a:r>
-              <a:rPr lang="fr-FR" dirty="0" smtClean="0"/>
-              <a:t>Travail personnel selon les compétences de chacun.</a:t>
-            </a:r>
-          </a:p>
-          <a:p>
-            <a:endParaRPr lang="fr-FR" dirty="0" smtClean="0"/>
-          </a:p>
-          <a:p>
-            <a:endParaRPr lang="fr-FR" dirty="0"/>
+        <p:spPr>
+          <a:xfrm>
+            <a:off x="467544" y="1052736"/>
+            <a:ext cx="7467600" cy="4525963"/>
+          </a:xfrm>
+        </p:spPr>
+        <p:txBody>
+          <a:bodyPr>
+            <a:normAutofit/>
+          </a:bodyPr>
+          <a:lstStyle/>
+          <a:p>
+            <a:pPr>
+              <a:buNone/>
+            </a:pPr>
+            <a:r>
+              <a:rPr lang="fr-FR" sz="2000" b="1" u="sng" dirty="0" smtClean="0"/>
+              <a:t>Etat du projet :</a:t>
+            </a:r>
+          </a:p>
+          <a:p>
+            <a:pPr>
+              <a:buNone/>
+            </a:pPr>
+            <a:endParaRPr lang="fr-FR" sz="2000" dirty="0" smtClean="0"/>
+          </a:p>
+          <a:p>
+            <a:pPr>
+              <a:buNone/>
+            </a:pPr>
+            <a:r>
+              <a:rPr lang="fr-FR" sz="2000" dirty="0" smtClean="0"/>
+              <a:t>Version jouable</a:t>
+            </a:r>
+          </a:p>
+          <a:p>
+            <a:pPr>
+              <a:buNone/>
+            </a:pPr>
+            <a:r>
+              <a:rPr lang="fr-FR" sz="2000" dirty="0" smtClean="0"/>
+              <a:t>Interaction complète ( sauf cas de porte a clé )</a:t>
+            </a:r>
+          </a:p>
+          <a:p>
+            <a:pPr>
+              <a:buNone/>
+            </a:pPr>
+            <a:endParaRPr lang="fr-FR" sz="2000" dirty="0" smtClean="0"/>
+          </a:p>
+          <a:p>
+            <a:pPr>
+              <a:buNone/>
+            </a:pPr>
+            <a:endParaRPr lang="fr-FR" sz="2000" dirty="0" smtClean="0"/>
+          </a:p>
+          <a:p>
+            <a:pPr>
+              <a:buNone/>
+            </a:pPr>
+            <a:r>
+              <a:rPr lang="fr-FR" sz="2000" b="1" u="sng" dirty="0" smtClean="0"/>
+              <a:t>Possibilités d’amélioration:</a:t>
+            </a:r>
+          </a:p>
+          <a:p>
+            <a:pPr>
+              <a:buNone/>
+            </a:pPr>
+            <a:endParaRPr lang="fr-FR" sz="2000" b="1" u="sng" dirty="0" smtClean="0"/>
+          </a:p>
+          <a:p>
+            <a:pPr>
+              <a:buNone/>
+            </a:pPr>
+            <a:r>
+              <a:rPr lang="fr-FR" sz="2000" dirty="0" smtClean="0"/>
+              <a:t>Optimisation de l’affichage graphique</a:t>
+            </a:r>
+          </a:p>
+          <a:p>
+            <a:pPr>
+              <a:buNone/>
+            </a:pPr>
+            <a:r>
+              <a:rPr lang="fr-FR" sz="2000" dirty="0" smtClean="0"/>
+              <a:t>Créer une carte a plus grande </a:t>
+            </a:r>
+            <a:r>
+              <a:rPr lang="fr-FR" sz="2000" dirty="0" err="1" smtClean="0"/>
+              <a:t>echelle</a:t>
+            </a:r>
+            <a:endParaRPr lang="fr-FR" sz="2000" dirty="0"/>
           </a:p>
         </p:txBody>
       </p:sp>
@@ -4157,7 +4379,7 @@
     <a:masterClrMapping/>
   </p:clrMapOvr>
   <p:transition>
-    <p:cover dir="u"/>
+    <p:pull dir="ld"/>
   </p:transition>
   <p:timing>
     <p:tnLst>
@@ -4196,127 +4418,6 @@
             <p:ph type="title"/>
           </p:nvPr>
         </p:nvSpPr>
-        <p:spPr/>
-        <p:txBody>
-          <a:bodyPr>
-            <a:normAutofit fontScale="90000"/>
-          </a:bodyPr>
-          <a:lstStyle/>
-          <a:p>
-            <a:r>
-              <a:rPr lang="fr-FR" dirty="0" smtClean="0"/>
-              <a:t>Pourcentage du projet effectué</a:t>
-            </a:r>
-            <a:endParaRPr lang="fr-FR" dirty="0"/>
-          </a:p>
-        </p:txBody>
-      </p:sp>
-      <p:sp>
-        <p:nvSpPr>
-          <p:cNvPr id="3" name="Espace réservé du contenu 2"/>
-          <p:cNvSpPr>
-            <a:spLocks noGrp="1"/>
-          </p:cNvSpPr>
-          <p:nvPr>
-            <p:ph idx="1"/>
-          </p:nvPr>
-        </p:nvSpPr>
-        <p:spPr/>
-        <p:txBody>
-          <a:bodyPr/>
-          <a:lstStyle/>
-          <a:p>
-            <a:r>
-              <a:rPr lang="fr-FR" dirty="0" smtClean="0"/>
-              <a:t>Jeremy 40%	 </a:t>
-            </a:r>
-          </a:p>
-          <a:p>
-            <a:r>
-              <a:rPr lang="fr-FR" dirty="0" err="1" smtClean="0"/>
-              <a:t>Thai</a:t>
-            </a:r>
-            <a:r>
-              <a:rPr lang="fr-FR" dirty="0" smtClean="0"/>
-              <a:t> </a:t>
-            </a:r>
-            <a:r>
-              <a:rPr lang="fr-FR" dirty="0" err="1" smtClean="0"/>
-              <a:t>Binh</a:t>
-            </a:r>
-            <a:r>
-              <a:rPr lang="fr-FR" dirty="0" smtClean="0"/>
-              <a:t> 30%</a:t>
-            </a:r>
-          </a:p>
-          <a:p>
-            <a:r>
-              <a:rPr lang="fr-FR" dirty="0" err="1" smtClean="0"/>
-              <a:t>Adem</a:t>
-            </a:r>
-            <a:r>
-              <a:rPr lang="fr-FR" dirty="0" smtClean="0"/>
-              <a:t> 15 %</a:t>
-            </a:r>
-          </a:p>
-          <a:p>
-            <a:r>
-              <a:rPr lang="fr-FR" dirty="0" err="1" smtClean="0"/>
-              <a:t>Loic</a:t>
-            </a:r>
-            <a:r>
-              <a:rPr lang="fr-FR" dirty="0" smtClean="0"/>
-              <a:t> 15 %</a:t>
-            </a:r>
-            <a:endParaRPr lang="fr-FR" dirty="0"/>
-          </a:p>
-        </p:txBody>
-      </p:sp>
-    </p:spTree>
-  </p:cSld>
-  <p:clrMapOvr>
-    <a:masterClrMapping/>
-  </p:clrMapOvr>
-  <p:transition>
-    <p:cover dir="u"/>
-  </p:transition>
-  <p:timing>
-    <p:tnLst>
-      <p:par>
-        <p:cTn id="1" dur="indefinite" restart="never" nodeType="tmRoot"/>
-      </p:par>
-    </p:tnLst>
-  </p:timing>
-</p:sld>
-</file>
-
-<file path=ppt/slides/slide7.xml><?xml version="1.0" encoding="utf-8"?>
-<p:sld xmlns:a="http://schemas.openxmlformats.org/drawingml/2006/main" xmlns:r="http://schemas.openxmlformats.org/officeDocument/2006/relationships" xmlns:p="http://schemas.openxmlformats.org/presentationml/2006/main">
-  <p:cSld>
-    <p:spTree>
-      <p:nvGrpSpPr>
-        <p:cNvPr id="1" name=""/>
-        <p:cNvGrpSpPr/>
-        <p:nvPr/>
-      </p:nvGrpSpPr>
-      <p:grpSpPr>
-        <a:xfrm>
-          <a:off x="0" y="0"/>
-          <a:ext cx="0" cy="0"/>
-          <a:chOff x="0" y="0"/>
-          <a:chExt cx="0" cy="0"/>
-        </a:xfrm>
-      </p:grpSpPr>
-      <p:sp>
-        <p:nvSpPr>
-          <p:cNvPr id="2" name="Titre 1"/>
-          <p:cNvSpPr>
-            <a:spLocks noGrp="1"/>
-          </p:cNvSpPr>
-          <p:nvPr>
-            <p:ph type="title"/>
-          </p:nvPr>
-        </p:nvSpPr>
         <p:spPr>
           <a:xfrm>
             <a:off x="428596" y="2428868"/>
@@ -4340,9 +4441,6 @@
   <p:clrMapOvr>
     <a:masterClrMapping/>
   </p:clrMapOvr>
-  <p:transition>
-    <p:cover dir="u"/>
-  </p:transition>
   <p:timing>
     <p:tnLst>
       <p:par>

</xml_diff>